<commit_message>
Updated table of contents
</commit_message>
<xml_diff>
--- a/PnP Transformation Process/Samples/PnP Transformation - Solution Design Report - Contoso.pptx
+++ b/PnP Transformation Process/Samples/PnP Transformation - Solution Design Report - Contoso.pptx
@@ -415,7 +415,7 @@
           <a:p>
             <a:fld id="{DE219B1A-AE41-483B-A766-69B9363DDA6A}" type="datetimeFigureOut">
               <a:rPr lang="en-US" smtClean="0"/>
-              <a:t>6/5/2015</a:t>
+              <a:t>6/11/2015</a:t>
             </a:fld>
             <a:endParaRPr lang="en-US"/>
           </a:p>
@@ -624,7 +624,7 @@
           <a:p>
             <a:fld id="{D51B1278-D92B-4AF3-A9C1-71DD298190CE}" type="datetimeFigureOut">
               <a:rPr lang="en-US" smtClean="0"/>
-              <a:t>6/5/2015</a:t>
+              <a:t>6/11/2015</a:t>
             </a:fld>
             <a:endParaRPr lang="en-US"/>
           </a:p>
@@ -1069,7 +1069,7 @@
                 </a:solidFill>
               </a:rPr>
               <a:pPr/>
-              <a:t>6/5/2015</a:t>
+              <a:t>6/11/2015</a:t>
             </a:fld>
             <a:endParaRPr lang="en-US" dirty="0">
               <a:solidFill>
@@ -1332,7 +1332,7 @@
           <a:p>
             <a:fld id="{EE679FBF-1C32-40EC-8A8D-F696D0F011B7}" type="datetime1">
               <a:rPr lang="en-US" smtClean="0"/>
-              <a:t>6/5/2015</a:t>
+              <a:t>6/11/2015</a:t>
             </a:fld>
             <a:endParaRPr lang="en-US"/>
           </a:p>
@@ -1566,7 +1566,7 @@
           <a:p>
             <a:fld id="{D1138656-1104-4895-916A-3F46DB26BB9D}" type="datetime1">
               <a:rPr lang="en-US" smtClean="0"/>
-              <a:t>6/5/2015</a:t>
+              <a:t>6/11/2015</a:t>
             </a:fld>
             <a:endParaRPr lang="en-US"/>
           </a:p>
@@ -1780,7 +1780,7 @@
           <a:p>
             <a:fld id="{D1138656-1104-4895-916A-3F46DB26BB9D}" type="datetime1">
               <a:rPr lang="en-US" smtClean="0"/>
-              <a:t>6/5/2015</a:t>
+              <a:t>6/11/2015</a:t>
             </a:fld>
             <a:endParaRPr lang="en-US"/>
           </a:p>
@@ -2014,7 +2014,7 @@
           <a:p>
             <a:fld id="{D1138656-1104-4895-916A-3F46DB26BB9D}" type="datetime1">
               <a:rPr lang="en-US" smtClean="0"/>
-              <a:t>6/5/2015</a:t>
+              <a:t>6/11/2015</a:t>
             </a:fld>
             <a:endParaRPr lang="en-US"/>
           </a:p>
@@ -2253,7 +2253,7 @@
                 </a:solidFill>
               </a:rPr>
               <a:pPr/>
-              <a:t>6/5/2015</a:t>
+              <a:t>6/11/2015</a:t>
             </a:fld>
             <a:endParaRPr lang="en-US">
               <a:solidFill>
@@ -2508,7 +2508,7 @@
           <a:p>
             <a:fld id="{451D34E3-A4EB-4733-B7C0-D045AD3234C1}" type="datetime1">
               <a:rPr lang="en-US" smtClean="0"/>
-              <a:t>6/5/2015</a:t>
+              <a:t>6/11/2015</a:t>
             </a:fld>
             <a:endParaRPr lang="en-US"/>
           </a:p>
@@ -2742,7 +2742,7 @@
           <a:p>
             <a:fld id="{AA3AF75D-25C3-42E7-9971-69168E23937F}" type="datetime1">
               <a:rPr lang="en-US" smtClean="0"/>
-              <a:t>6/5/2015</a:t>
+              <a:t>6/11/2015</a:t>
             </a:fld>
             <a:endParaRPr lang="en-US"/>
           </a:p>
@@ -2957,7 +2957,7 @@
                 </a:solidFill>
               </a:rPr>
               <a:pPr/>
-              <a:t>6/5/2015</a:t>
+              <a:t>6/11/2015</a:t>
             </a:fld>
             <a:endParaRPr lang="en-US">
               <a:solidFill>
@@ -3184,7 +3184,7 @@
           <a:p>
             <a:fld id="{0B49ECD6-2B5F-4BFE-A8F3-6C5940E5A932}" type="datetime1">
               <a:rPr lang="en-US" smtClean="0"/>
-              <a:t>6/5/2015</a:t>
+              <a:t>6/11/2015</a:t>
             </a:fld>
             <a:endParaRPr lang="en-US"/>
           </a:p>
@@ -3495,7 +3495,7 @@
                 </a:solidFill>
               </a:rPr>
               <a:pPr/>
-              <a:t>6/5/2015</a:t>
+              <a:t>6/11/2015</a:t>
             </a:fld>
             <a:endParaRPr lang="en-US">
               <a:solidFill>
@@ -3753,7 +3753,7 @@
                 </a:solidFill>
               </a:rPr>
               <a:pPr/>
-              <a:t>6/5/2015</a:t>
+              <a:t>6/11/2015</a:t>
             </a:fld>
             <a:endParaRPr lang="en-US" dirty="0">
               <a:solidFill>
@@ -4002,7 +4002,7 @@
                 </a:solidFill>
               </a:rPr>
               <a:pPr/>
-              <a:t>6/5/2015</a:t>
+              <a:t>6/11/2015</a:t>
             </a:fld>
             <a:endParaRPr lang="en-US">
               <a:solidFill>
@@ -4273,7 +4273,7 @@
           <a:p>
             <a:fld id="{152427C8-1870-4D04-BF1C-4B85DC18AB6D}" type="datetime1">
               <a:rPr lang="en-US" smtClean="0"/>
-              <a:t>6/5/2015</a:t>
+              <a:t>6/11/2015</a:t>
             </a:fld>
             <a:endParaRPr lang="en-US"/>
           </a:p>
@@ -4493,7 +4493,7 @@
           <a:p>
             <a:fld id="{094F81B1-FE33-4866-9415-4EA33D10F9E8}" type="datetime1">
               <a:rPr lang="en-US" smtClean="0"/>
-              <a:t>6/5/2015</a:t>
+              <a:t>6/11/2015</a:t>
             </a:fld>
             <a:endParaRPr lang="en-US"/>
           </a:p>
@@ -4727,7 +4727,7 @@
           <a:p>
             <a:fld id="{AE18C4A6-F14F-41E5-9C64-E690240F93F9}" type="datetime1">
               <a:rPr lang="en-US" smtClean="0"/>
-              <a:t>6/5/2015</a:t>
+              <a:t>6/11/2015</a:t>
             </a:fld>
             <a:endParaRPr lang="en-US"/>
           </a:p>
@@ -4966,7 +4966,7 @@
                 </a:solidFill>
               </a:rPr>
               <a:pPr/>
-              <a:t>6/5/2015</a:t>
+              <a:t>6/11/2015</a:t>
             </a:fld>
             <a:endParaRPr lang="en-US">
               <a:solidFill>
@@ -5221,7 +5221,7 @@
           <a:p>
             <a:fld id="{8E807F05-A7DA-4BF4-B992-4D1E30BA3021}" type="datetime1">
               <a:rPr lang="en-US" smtClean="0"/>
-              <a:t>6/5/2015</a:t>
+              <a:t>6/11/2015</a:t>
             </a:fld>
             <a:endParaRPr lang="en-US"/>
           </a:p>
@@ -5455,7 +5455,7 @@
           <a:p>
             <a:fld id="{EE679FBF-1C32-40EC-8A8D-F696D0F011B7}" type="datetime1">
               <a:rPr lang="en-US" smtClean="0"/>
-              <a:t>6/5/2015</a:t>
+              <a:t>6/11/2015</a:t>
             </a:fld>
             <a:endParaRPr lang="en-US"/>
           </a:p>
@@ -16930,7 +16930,7 @@
                 <a:gridCol w="2373524">
                   <a:extLst>
                     <a:ext uri="{9D8B030D-6E8A-4147-A177-3AD203B41FA5}">
-                      <a16:colId xmlns:a16="http://schemas.microsoft.com/office/drawing/2014/main" xmlns="" val="20000"/>
+                      <a16:colId xmlns="" xmlns:a16="http://schemas.microsoft.com/office/drawing/2014/main" val="20000"/>
                     </a:ext>
                   </a:extLst>
                 </a:gridCol>
@@ -16993,7 +16993,7 @@
                 </a:tc>
                 <a:extLst>
                   <a:ext uri="{0D108BD9-81ED-4DB2-BD59-A6C34878D82A}">
-                    <a16:rowId xmlns:a16="http://schemas.microsoft.com/office/drawing/2014/main" xmlns="" val="10000"/>
+                    <a16:rowId xmlns="" xmlns:a16="http://schemas.microsoft.com/office/drawing/2014/main" val="10000"/>
                   </a:ext>
                 </a:extLst>
               </a:tr>
@@ -17054,7 +17054,7 @@
                 </a:tc>
                 <a:extLst>
                   <a:ext uri="{0D108BD9-81ED-4DB2-BD59-A6C34878D82A}">
-                    <a16:rowId xmlns:a16="http://schemas.microsoft.com/office/drawing/2014/main" xmlns="" val="10001"/>
+                    <a16:rowId xmlns="" xmlns:a16="http://schemas.microsoft.com/office/drawing/2014/main" val="10001"/>
                   </a:ext>
                 </a:extLst>
               </a:tr>
@@ -17124,7 +17124,7 @@
                 </a:tc>
                 <a:extLst>
                   <a:ext uri="{0D108BD9-81ED-4DB2-BD59-A6C34878D82A}">
-                    <a16:rowId xmlns:a16="http://schemas.microsoft.com/office/drawing/2014/main" xmlns="" val="10002"/>
+                    <a16:rowId xmlns="" xmlns:a16="http://schemas.microsoft.com/office/drawing/2014/main" val="10002"/>
                   </a:ext>
                 </a:extLst>
               </a:tr>
@@ -17202,7 +17202,7 @@
                 </a:tc>
                 <a:extLst>
                   <a:ext uri="{0D108BD9-81ED-4DB2-BD59-A6C34878D82A}">
-                    <a16:rowId xmlns:a16="http://schemas.microsoft.com/office/drawing/2014/main" xmlns="" val="10007"/>
+                    <a16:rowId xmlns="" xmlns:a16="http://schemas.microsoft.com/office/drawing/2014/main" val="10007"/>
                   </a:ext>
                 </a:extLst>
               </a:tr>
@@ -17778,7 +17778,7 @@
                 <a:gridCol w="2373524">
                   <a:extLst>
                     <a:ext uri="{9D8B030D-6E8A-4147-A177-3AD203B41FA5}">
-                      <a16:colId xmlns:a16="http://schemas.microsoft.com/office/drawing/2014/main" xmlns="" val="20000"/>
+                      <a16:colId xmlns="" xmlns:a16="http://schemas.microsoft.com/office/drawing/2014/main" val="20000"/>
                     </a:ext>
                   </a:extLst>
                 </a:gridCol>
@@ -17841,7 +17841,7 @@
                 </a:tc>
                 <a:extLst>
                   <a:ext uri="{0D108BD9-81ED-4DB2-BD59-A6C34878D82A}">
-                    <a16:rowId xmlns:a16="http://schemas.microsoft.com/office/drawing/2014/main" xmlns="" val="10000"/>
+                    <a16:rowId xmlns="" xmlns:a16="http://schemas.microsoft.com/office/drawing/2014/main" val="10000"/>
                   </a:ext>
                 </a:extLst>
               </a:tr>
@@ -17902,7 +17902,7 @@
                 </a:tc>
                 <a:extLst>
                   <a:ext uri="{0D108BD9-81ED-4DB2-BD59-A6C34878D82A}">
-                    <a16:rowId xmlns:a16="http://schemas.microsoft.com/office/drawing/2014/main" xmlns="" val="10001"/>
+                    <a16:rowId xmlns="" xmlns:a16="http://schemas.microsoft.com/office/drawing/2014/main" val="10001"/>
                   </a:ext>
                 </a:extLst>
               </a:tr>
@@ -17972,7 +17972,7 @@
                 </a:tc>
                 <a:extLst>
                   <a:ext uri="{0D108BD9-81ED-4DB2-BD59-A6C34878D82A}">
-                    <a16:rowId xmlns:a16="http://schemas.microsoft.com/office/drawing/2014/main" xmlns="" val="10002"/>
+                    <a16:rowId xmlns="" xmlns:a16="http://schemas.microsoft.com/office/drawing/2014/main" val="10002"/>
                   </a:ext>
                 </a:extLst>
               </a:tr>
@@ -18050,7 +18050,7 @@
                 </a:tc>
                 <a:extLst>
                   <a:ext uri="{0D108BD9-81ED-4DB2-BD59-A6C34878D82A}">
-                    <a16:rowId xmlns:a16="http://schemas.microsoft.com/office/drawing/2014/main" xmlns="" val="10007"/>
+                    <a16:rowId xmlns="" xmlns:a16="http://schemas.microsoft.com/office/drawing/2014/main" val="10007"/>
                   </a:ext>
                 </a:extLst>
               </a:tr>
@@ -18652,7 +18652,7 @@
                 <a:gridCol w="2373524">
                   <a:extLst>
                     <a:ext uri="{9D8B030D-6E8A-4147-A177-3AD203B41FA5}">
-                      <a16:colId xmlns:a16="http://schemas.microsoft.com/office/drawing/2014/main" xmlns="" val="20000"/>
+                      <a16:colId xmlns="" xmlns:a16="http://schemas.microsoft.com/office/drawing/2014/main" val="20000"/>
                     </a:ext>
                   </a:extLst>
                 </a:gridCol>
@@ -18715,7 +18715,7 @@
                 </a:tc>
                 <a:extLst>
                   <a:ext uri="{0D108BD9-81ED-4DB2-BD59-A6C34878D82A}">
-                    <a16:rowId xmlns:a16="http://schemas.microsoft.com/office/drawing/2014/main" xmlns="" val="10000"/>
+                    <a16:rowId xmlns="" xmlns:a16="http://schemas.microsoft.com/office/drawing/2014/main" val="10000"/>
                   </a:ext>
                 </a:extLst>
               </a:tr>
@@ -18776,7 +18776,7 @@
                 </a:tc>
                 <a:extLst>
                   <a:ext uri="{0D108BD9-81ED-4DB2-BD59-A6C34878D82A}">
-                    <a16:rowId xmlns:a16="http://schemas.microsoft.com/office/drawing/2014/main" xmlns="" val="10001"/>
+                    <a16:rowId xmlns="" xmlns:a16="http://schemas.microsoft.com/office/drawing/2014/main" val="10001"/>
                   </a:ext>
                 </a:extLst>
               </a:tr>
@@ -18846,7 +18846,7 @@
                 </a:tc>
                 <a:extLst>
                   <a:ext uri="{0D108BD9-81ED-4DB2-BD59-A6C34878D82A}">
-                    <a16:rowId xmlns:a16="http://schemas.microsoft.com/office/drawing/2014/main" xmlns="" val="10002"/>
+                    <a16:rowId xmlns="" xmlns:a16="http://schemas.microsoft.com/office/drawing/2014/main" val="10002"/>
                   </a:ext>
                 </a:extLst>
               </a:tr>
@@ -18924,7 +18924,7 @@
                 </a:tc>
                 <a:extLst>
                   <a:ext uri="{0D108BD9-81ED-4DB2-BD59-A6C34878D82A}">
-                    <a16:rowId xmlns:a16="http://schemas.microsoft.com/office/drawing/2014/main" xmlns="" val="10007"/>
+                    <a16:rowId xmlns="" xmlns:a16="http://schemas.microsoft.com/office/drawing/2014/main" val="10007"/>
                   </a:ext>
                 </a:extLst>
               </a:tr>
@@ -19433,7 +19433,7 @@
                 <a:gridCol w="2591254">
                   <a:extLst>
                     <a:ext uri="{9D8B030D-6E8A-4147-A177-3AD203B41FA5}">
-                      <a16:colId xmlns:a16="http://schemas.microsoft.com/office/drawing/2014/main" xmlns="" val="20000"/>
+                      <a16:colId xmlns="" xmlns:a16="http://schemas.microsoft.com/office/drawing/2014/main" val="20000"/>
                     </a:ext>
                   </a:extLst>
                 </a:gridCol>
@@ -19496,7 +19496,7 @@
                 </a:tc>
                 <a:extLst>
                   <a:ext uri="{0D108BD9-81ED-4DB2-BD59-A6C34878D82A}">
-                    <a16:rowId xmlns:a16="http://schemas.microsoft.com/office/drawing/2014/main" xmlns="" val="10000"/>
+                    <a16:rowId xmlns="" xmlns:a16="http://schemas.microsoft.com/office/drawing/2014/main" val="10000"/>
                   </a:ext>
                 </a:extLst>
               </a:tr>
@@ -19557,7 +19557,7 @@
                 </a:tc>
                 <a:extLst>
                   <a:ext uri="{0D108BD9-81ED-4DB2-BD59-A6C34878D82A}">
-                    <a16:rowId xmlns:a16="http://schemas.microsoft.com/office/drawing/2014/main" xmlns="" val="10001"/>
+                    <a16:rowId xmlns="" xmlns:a16="http://schemas.microsoft.com/office/drawing/2014/main" val="10001"/>
                   </a:ext>
                 </a:extLst>
               </a:tr>
@@ -19627,7 +19627,7 @@
                 </a:tc>
                 <a:extLst>
                   <a:ext uri="{0D108BD9-81ED-4DB2-BD59-A6C34878D82A}">
-                    <a16:rowId xmlns:a16="http://schemas.microsoft.com/office/drawing/2014/main" xmlns="" val="10002"/>
+                    <a16:rowId xmlns="" xmlns:a16="http://schemas.microsoft.com/office/drawing/2014/main" val="10002"/>
                   </a:ext>
                 </a:extLst>
               </a:tr>
@@ -19705,7 +19705,7 @@
                 </a:tc>
                 <a:extLst>
                   <a:ext uri="{0D108BD9-81ED-4DB2-BD59-A6C34878D82A}">
-                    <a16:rowId xmlns:a16="http://schemas.microsoft.com/office/drawing/2014/main" xmlns="" val="10007"/>
+                    <a16:rowId xmlns="" xmlns:a16="http://schemas.microsoft.com/office/drawing/2014/main" val="10007"/>
                   </a:ext>
                 </a:extLst>
               </a:tr>
@@ -20399,7 +20399,7 @@
                 <a:gridCol w="2743200">
                   <a:extLst>
                     <a:ext uri="{9D8B030D-6E8A-4147-A177-3AD203B41FA5}">
-                      <a16:colId xmlns:a16="http://schemas.microsoft.com/office/drawing/2014/main" xmlns="" val="20000"/>
+                      <a16:colId xmlns="" xmlns:a16="http://schemas.microsoft.com/office/drawing/2014/main" val="20000"/>
                     </a:ext>
                   </a:extLst>
                 </a:gridCol>
@@ -20482,7 +20482,7 @@
                 </a:tc>
                 <a:extLst>
                   <a:ext uri="{0D108BD9-81ED-4DB2-BD59-A6C34878D82A}">
-                    <a16:rowId xmlns:a16="http://schemas.microsoft.com/office/drawing/2014/main" xmlns="" val="10000"/>
+                    <a16:rowId xmlns="" xmlns:a16="http://schemas.microsoft.com/office/drawing/2014/main" val="10000"/>
                   </a:ext>
                 </a:extLst>
               </a:tr>
@@ -20543,7 +20543,7 @@
                 </a:tc>
                 <a:extLst>
                   <a:ext uri="{0D108BD9-81ED-4DB2-BD59-A6C34878D82A}">
-                    <a16:rowId xmlns:a16="http://schemas.microsoft.com/office/drawing/2014/main" xmlns="" val="10001"/>
+                    <a16:rowId xmlns="" xmlns:a16="http://schemas.microsoft.com/office/drawing/2014/main" val="10001"/>
                   </a:ext>
                 </a:extLst>
               </a:tr>
@@ -20613,7 +20613,7 @@
                 </a:tc>
                 <a:extLst>
                   <a:ext uri="{0D108BD9-81ED-4DB2-BD59-A6C34878D82A}">
-                    <a16:rowId xmlns:a16="http://schemas.microsoft.com/office/drawing/2014/main" xmlns="" val="10002"/>
+                    <a16:rowId xmlns="" xmlns:a16="http://schemas.microsoft.com/office/drawing/2014/main" val="10002"/>
                   </a:ext>
                 </a:extLst>
               </a:tr>
@@ -20691,7 +20691,7 @@
                 </a:tc>
                 <a:extLst>
                   <a:ext uri="{0D108BD9-81ED-4DB2-BD59-A6C34878D82A}">
-                    <a16:rowId xmlns:a16="http://schemas.microsoft.com/office/drawing/2014/main" xmlns="" val="10007"/>
+                    <a16:rowId xmlns="" xmlns:a16="http://schemas.microsoft.com/office/drawing/2014/main" val="10007"/>
                   </a:ext>
                 </a:extLst>
               </a:tr>
@@ -21681,7 +21681,7 @@
                 <a:gridCol w="2373524">
                   <a:extLst>
                     <a:ext uri="{9D8B030D-6E8A-4147-A177-3AD203B41FA5}">
-                      <a16:colId xmlns:a16="http://schemas.microsoft.com/office/drawing/2014/main" xmlns="" val="20000"/>
+                      <a16:colId xmlns="" xmlns:a16="http://schemas.microsoft.com/office/drawing/2014/main" val="20000"/>
                     </a:ext>
                   </a:extLst>
                 </a:gridCol>
@@ -21744,7 +21744,7 @@
                 </a:tc>
                 <a:extLst>
                   <a:ext uri="{0D108BD9-81ED-4DB2-BD59-A6C34878D82A}">
-                    <a16:rowId xmlns:a16="http://schemas.microsoft.com/office/drawing/2014/main" xmlns="" val="10000"/>
+                    <a16:rowId xmlns="" xmlns:a16="http://schemas.microsoft.com/office/drawing/2014/main" val="10000"/>
                   </a:ext>
                 </a:extLst>
               </a:tr>
@@ -21805,7 +21805,7 @@
                 </a:tc>
                 <a:extLst>
                   <a:ext uri="{0D108BD9-81ED-4DB2-BD59-A6C34878D82A}">
-                    <a16:rowId xmlns:a16="http://schemas.microsoft.com/office/drawing/2014/main" xmlns="" val="10001"/>
+                    <a16:rowId xmlns="" xmlns:a16="http://schemas.microsoft.com/office/drawing/2014/main" val="10001"/>
                   </a:ext>
                 </a:extLst>
               </a:tr>
@@ -21875,7 +21875,7 @@
                 </a:tc>
                 <a:extLst>
                   <a:ext uri="{0D108BD9-81ED-4DB2-BD59-A6C34878D82A}">
-                    <a16:rowId xmlns:a16="http://schemas.microsoft.com/office/drawing/2014/main" xmlns="" val="10002"/>
+                    <a16:rowId xmlns="" xmlns:a16="http://schemas.microsoft.com/office/drawing/2014/main" val="10002"/>
                   </a:ext>
                 </a:extLst>
               </a:tr>
@@ -21953,7 +21953,7 @@
                 </a:tc>
                 <a:extLst>
                   <a:ext uri="{0D108BD9-81ED-4DB2-BD59-A6C34878D82A}">
-                    <a16:rowId xmlns:a16="http://schemas.microsoft.com/office/drawing/2014/main" xmlns="" val="10007"/>
+                    <a16:rowId xmlns="" xmlns:a16="http://schemas.microsoft.com/office/drawing/2014/main" val="10007"/>
                   </a:ext>
                 </a:extLst>
               </a:tr>
@@ -22453,7 +22453,7 @@
                 <a:gridCol w="2373524">
                   <a:extLst>
                     <a:ext uri="{9D8B030D-6E8A-4147-A177-3AD203B41FA5}">
-                      <a16:colId xmlns:a16="http://schemas.microsoft.com/office/drawing/2014/main" xmlns="" val="20000"/>
+                      <a16:colId xmlns="" xmlns:a16="http://schemas.microsoft.com/office/drawing/2014/main" val="20000"/>
                     </a:ext>
                   </a:extLst>
                 </a:gridCol>
@@ -22516,7 +22516,7 @@
                 </a:tc>
                 <a:extLst>
                   <a:ext uri="{0D108BD9-81ED-4DB2-BD59-A6C34878D82A}">
-                    <a16:rowId xmlns:a16="http://schemas.microsoft.com/office/drawing/2014/main" xmlns="" val="10000"/>
+                    <a16:rowId xmlns="" xmlns:a16="http://schemas.microsoft.com/office/drawing/2014/main" val="10000"/>
                   </a:ext>
                 </a:extLst>
               </a:tr>
@@ -22577,7 +22577,7 @@
                 </a:tc>
                 <a:extLst>
                   <a:ext uri="{0D108BD9-81ED-4DB2-BD59-A6C34878D82A}">
-                    <a16:rowId xmlns:a16="http://schemas.microsoft.com/office/drawing/2014/main" xmlns="" val="10001"/>
+                    <a16:rowId xmlns="" xmlns:a16="http://schemas.microsoft.com/office/drawing/2014/main" val="10001"/>
                   </a:ext>
                 </a:extLst>
               </a:tr>
@@ -22647,7 +22647,7 @@
                 </a:tc>
                 <a:extLst>
                   <a:ext uri="{0D108BD9-81ED-4DB2-BD59-A6C34878D82A}">
-                    <a16:rowId xmlns:a16="http://schemas.microsoft.com/office/drawing/2014/main" xmlns="" val="10002"/>
+                    <a16:rowId xmlns="" xmlns:a16="http://schemas.microsoft.com/office/drawing/2014/main" val="10002"/>
                   </a:ext>
                 </a:extLst>
               </a:tr>
@@ -22725,7 +22725,7 @@
                 </a:tc>
                 <a:extLst>
                   <a:ext uri="{0D108BD9-81ED-4DB2-BD59-A6C34878D82A}">
-                    <a16:rowId xmlns:a16="http://schemas.microsoft.com/office/drawing/2014/main" xmlns="" val="10007"/>
+                    <a16:rowId xmlns="" xmlns:a16="http://schemas.microsoft.com/office/drawing/2014/main" val="10007"/>
                   </a:ext>
                 </a:extLst>
               </a:tr>
@@ -23382,7 +23382,7 @@
                 <a:gridCol w="2373524">
                   <a:extLst>
                     <a:ext uri="{9D8B030D-6E8A-4147-A177-3AD203B41FA5}">
-                      <a16:colId xmlns:a16="http://schemas.microsoft.com/office/drawing/2014/main" xmlns="" val="20000"/>
+                      <a16:colId xmlns="" xmlns:a16="http://schemas.microsoft.com/office/drawing/2014/main" val="20000"/>
                     </a:ext>
                   </a:extLst>
                 </a:gridCol>
@@ -23445,7 +23445,7 @@
                 </a:tc>
                 <a:extLst>
                   <a:ext uri="{0D108BD9-81ED-4DB2-BD59-A6C34878D82A}">
-                    <a16:rowId xmlns:a16="http://schemas.microsoft.com/office/drawing/2014/main" xmlns="" val="10000"/>
+                    <a16:rowId xmlns="" xmlns:a16="http://schemas.microsoft.com/office/drawing/2014/main" val="10000"/>
                   </a:ext>
                 </a:extLst>
               </a:tr>
@@ -23506,7 +23506,7 @@
                 </a:tc>
                 <a:extLst>
                   <a:ext uri="{0D108BD9-81ED-4DB2-BD59-A6C34878D82A}">
-                    <a16:rowId xmlns:a16="http://schemas.microsoft.com/office/drawing/2014/main" xmlns="" val="10001"/>
+                    <a16:rowId xmlns="" xmlns:a16="http://schemas.microsoft.com/office/drawing/2014/main" val="10001"/>
                   </a:ext>
                 </a:extLst>
               </a:tr>
@@ -23576,7 +23576,7 @@
                 </a:tc>
                 <a:extLst>
                   <a:ext uri="{0D108BD9-81ED-4DB2-BD59-A6C34878D82A}">
-                    <a16:rowId xmlns:a16="http://schemas.microsoft.com/office/drawing/2014/main" xmlns="" val="10002"/>
+                    <a16:rowId xmlns="" xmlns:a16="http://schemas.microsoft.com/office/drawing/2014/main" val="10002"/>
                   </a:ext>
                 </a:extLst>
               </a:tr>
@@ -23654,7 +23654,7 @@
                 </a:tc>
                 <a:extLst>
                   <a:ext uri="{0D108BD9-81ED-4DB2-BD59-A6C34878D82A}">
-                    <a16:rowId xmlns:a16="http://schemas.microsoft.com/office/drawing/2014/main" xmlns="" val="10007"/>
+                    <a16:rowId xmlns="" xmlns:a16="http://schemas.microsoft.com/office/drawing/2014/main" val="10007"/>
                   </a:ext>
                 </a:extLst>
               </a:tr>
@@ -24200,7 +24200,7 @@
                 <a:gridCol w="2373524">
                   <a:extLst>
                     <a:ext uri="{9D8B030D-6E8A-4147-A177-3AD203B41FA5}">
-                      <a16:colId xmlns:a16="http://schemas.microsoft.com/office/drawing/2014/main" xmlns="" val="20000"/>
+                      <a16:colId xmlns="" xmlns:a16="http://schemas.microsoft.com/office/drawing/2014/main" val="20000"/>
                     </a:ext>
                   </a:extLst>
                 </a:gridCol>
@@ -24263,7 +24263,7 @@
                 </a:tc>
                 <a:extLst>
                   <a:ext uri="{0D108BD9-81ED-4DB2-BD59-A6C34878D82A}">
-                    <a16:rowId xmlns:a16="http://schemas.microsoft.com/office/drawing/2014/main" xmlns="" val="10000"/>
+                    <a16:rowId xmlns="" xmlns:a16="http://schemas.microsoft.com/office/drawing/2014/main" val="10000"/>
                   </a:ext>
                 </a:extLst>
               </a:tr>
@@ -24324,7 +24324,7 @@
                 </a:tc>
                 <a:extLst>
                   <a:ext uri="{0D108BD9-81ED-4DB2-BD59-A6C34878D82A}">
-                    <a16:rowId xmlns:a16="http://schemas.microsoft.com/office/drawing/2014/main" xmlns="" val="10001"/>
+                    <a16:rowId xmlns="" xmlns:a16="http://schemas.microsoft.com/office/drawing/2014/main" val="10001"/>
                   </a:ext>
                 </a:extLst>
               </a:tr>
@@ -24394,7 +24394,7 @@
                 </a:tc>
                 <a:extLst>
                   <a:ext uri="{0D108BD9-81ED-4DB2-BD59-A6C34878D82A}">
-                    <a16:rowId xmlns:a16="http://schemas.microsoft.com/office/drawing/2014/main" xmlns="" val="10002"/>
+                    <a16:rowId xmlns="" xmlns:a16="http://schemas.microsoft.com/office/drawing/2014/main" val="10002"/>
                   </a:ext>
                 </a:extLst>
               </a:tr>
@@ -24472,7 +24472,7 @@
                 </a:tc>
                 <a:extLst>
                   <a:ext uri="{0D108BD9-81ED-4DB2-BD59-A6C34878D82A}">
-                    <a16:rowId xmlns:a16="http://schemas.microsoft.com/office/drawing/2014/main" xmlns="" val="10007"/>
+                    <a16:rowId xmlns="" xmlns:a16="http://schemas.microsoft.com/office/drawing/2014/main" val="10007"/>
                   </a:ext>
                 </a:extLst>
               </a:tr>
@@ -24682,7 +24682,7 @@
                 <a:gridCol w="2373524">
                   <a:extLst>
                     <a:ext uri="{9D8B030D-6E8A-4147-A177-3AD203B41FA5}">
-                      <a16:colId xmlns:a16="http://schemas.microsoft.com/office/drawing/2014/main" xmlns="" val="20000"/>
+                      <a16:colId xmlns="" xmlns:a16="http://schemas.microsoft.com/office/drawing/2014/main" val="20000"/>
                     </a:ext>
                   </a:extLst>
                 </a:gridCol>
@@ -24745,7 +24745,7 @@
                 </a:tc>
                 <a:extLst>
                   <a:ext uri="{0D108BD9-81ED-4DB2-BD59-A6C34878D82A}">
-                    <a16:rowId xmlns:a16="http://schemas.microsoft.com/office/drawing/2014/main" xmlns="" val="10000"/>
+                    <a16:rowId xmlns="" xmlns:a16="http://schemas.microsoft.com/office/drawing/2014/main" val="10000"/>
                   </a:ext>
                 </a:extLst>
               </a:tr>
@@ -24806,7 +24806,7 @@
                 </a:tc>
                 <a:extLst>
                   <a:ext uri="{0D108BD9-81ED-4DB2-BD59-A6C34878D82A}">
-                    <a16:rowId xmlns:a16="http://schemas.microsoft.com/office/drawing/2014/main" xmlns="" val="10001"/>
+                    <a16:rowId xmlns="" xmlns:a16="http://schemas.microsoft.com/office/drawing/2014/main" val="10001"/>
                   </a:ext>
                 </a:extLst>
               </a:tr>
@@ -24884,7 +24884,7 @@
                 </a:tc>
                 <a:extLst>
                   <a:ext uri="{0D108BD9-81ED-4DB2-BD59-A6C34878D82A}">
-                    <a16:rowId xmlns:a16="http://schemas.microsoft.com/office/drawing/2014/main" xmlns="" val="10002"/>
+                    <a16:rowId xmlns="" xmlns:a16="http://schemas.microsoft.com/office/drawing/2014/main" val="10002"/>
                   </a:ext>
                 </a:extLst>
               </a:tr>
@@ -24966,7 +24966,7 @@
                 </a:tc>
                 <a:extLst>
                   <a:ext uri="{0D108BD9-81ED-4DB2-BD59-A6C34878D82A}">
-                    <a16:rowId xmlns:a16="http://schemas.microsoft.com/office/drawing/2014/main" xmlns="" val="10007"/>
+                    <a16:rowId xmlns="" xmlns:a16="http://schemas.microsoft.com/office/drawing/2014/main" val="10007"/>
                   </a:ext>
                 </a:extLst>
               </a:tr>
@@ -25835,7 +25835,7 @@
                 <a:gridCol w="2743200">
                   <a:extLst>
                     <a:ext uri="{9D8B030D-6E8A-4147-A177-3AD203B41FA5}">
-                      <a16:colId xmlns:a16="http://schemas.microsoft.com/office/drawing/2014/main" xmlns="" val="20000"/>
+                      <a16:colId xmlns="" xmlns:a16="http://schemas.microsoft.com/office/drawing/2014/main" val="20000"/>
                     </a:ext>
                   </a:extLst>
                 </a:gridCol>
@@ -25898,7 +25898,7 @@
                 </a:tc>
                 <a:extLst>
                   <a:ext uri="{0D108BD9-81ED-4DB2-BD59-A6C34878D82A}">
-                    <a16:rowId xmlns:a16="http://schemas.microsoft.com/office/drawing/2014/main" xmlns="" val="10000"/>
+                    <a16:rowId xmlns="" xmlns:a16="http://schemas.microsoft.com/office/drawing/2014/main" val="10000"/>
                   </a:ext>
                 </a:extLst>
               </a:tr>
@@ -25959,7 +25959,7 @@
                 </a:tc>
                 <a:extLst>
                   <a:ext uri="{0D108BD9-81ED-4DB2-BD59-A6C34878D82A}">
-                    <a16:rowId xmlns:a16="http://schemas.microsoft.com/office/drawing/2014/main" xmlns="" val="10001"/>
+                    <a16:rowId xmlns="" xmlns:a16="http://schemas.microsoft.com/office/drawing/2014/main" val="10001"/>
                   </a:ext>
                 </a:extLst>
               </a:tr>
@@ -26029,7 +26029,7 @@
                 </a:tc>
                 <a:extLst>
                   <a:ext uri="{0D108BD9-81ED-4DB2-BD59-A6C34878D82A}">
-                    <a16:rowId xmlns:a16="http://schemas.microsoft.com/office/drawing/2014/main" xmlns="" val="10002"/>
+                    <a16:rowId xmlns="" xmlns:a16="http://schemas.microsoft.com/office/drawing/2014/main" val="10002"/>
                   </a:ext>
                 </a:extLst>
               </a:tr>
@@ -26111,7 +26111,7 @@
                 </a:tc>
                 <a:extLst>
                   <a:ext uri="{0D108BD9-81ED-4DB2-BD59-A6C34878D82A}">
-                    <a16:rowId xmlns:a16="http://schemas.microsoft.com/office/drawing/2014/main" xmlns="" val="10007"/>
+                    <a16:rowId xmlns="" xmlns:a16="http://schemas.microsoft.com/office/drawing/2014/main" val="10007"/>
                   </a:ext>
                 </a:extLst>
               </a:tr>
@@ -31903,28 +31903,28 @@
                 <a:gridCol w="2794925">
                   <a:extLst>
                     <a:ext uri="{9D8B030D-6E8A-4147-A177-3AD203B41FA5}">
-                      <a16:colId xmlns:a16="http://schemas.microsoft.com/office/drawing/2014/main" xmlns="" val="20000"/>
+                      <a16:colId xmlns="" xmlns:a16="http://schemas.microsoft.com/office/drawing/2014/main" val="20000"/>
                     </a:ext>
                   </a:extLst>
                 </a:gridCol>
                 <a:gridCol w="2683565">
                   <a:extLst>
                     <a:ext uri="{9D8B030D-6E8A-4147-A177-3AD203B41FA5}">
-                      <a16:colId xmlns:a16="http://schemas.microsoft.com/office/drawing/2014/main" xmlns="" val="20001"/>
+                      <a16:colId xmlns="" xmlns:a16="http://schemas.microsoft.com/office/drawing/2014/main" val="20001"/>
                     </a:ext>
                   </a:extLst>
                 </a:gridCol>
                 <a:gridCol w="2623930">
                   <a:extLst>
                     <a:ext uri="{9D8B030D-6E8A-4147-A177-3AD203B41FA5}">
-                      <a16:colId xmlns:a16="http://schemas.microsoft.com/office/drawing/2014/main" xmlns="" val="20002"/>
+                      <a16:colId xmlns="" xmlns:a16="http://schemas.microsoft.com/office/drawing/2014/main" val="20002"/>
                     </a:ext>
                   </a:extLst>
                 </a:gridCol>
                 <a:gridCol w="2855843">
                   <a:extLst>
                     <a:ext uri="{9D8B030D-6E8A-4147-A177-3AD203B41FA5}">
-                      <a16:colId xmlns:a16="http://schemas.microsoft.com/office/drawing/2014/main" xmlns="" val="20003"/>
+                      <a16:colId xmlns="" xmlns:a16="http://schemas.microsoft.com/office/drawing/2014/main" val="20003"/>
                     </a:ext>
                   </a:extLst>
                 </a:gridCol>
@@ -32141,7 +32141,7 @@
                 </a:tc>
                 <a:extLst>
                   <a:ext uri="{0D108BD9-81ED-4DB2-BD59-A6C34878D82A}">
-                    <a16:rowId xmlns:a16="http://schemas.microsoft.com/office/drawing/2014/main" xmlns="" val="10000"/>
+                    <a16:rowId xmlns="" xmlns:a16="http://schemas.microsoft.com/office/drawing/2014/main" val="10000"/>
                   </a:ext>
                 </a:extLst>
               </a:tr>
@@ -32359,7 +32359,7 @@
                 </a:tc>
                 <a:extLst>
                   <a:ext uri="{0D108BD9-81ED-4DB2-BD59-A6C34878D82A}">
-                    <a16:rowId xmlns:a16="http://schemas.microsoft.com/office/drawing/2014/main" xmlns="" val="10001"/>
+                    <a16:rowId xmlns="" xmlns:a16="http://schemas.microsoft.com/office/drawing/2014/main" val="10001"/>
                   </a:ext>
                 </a:extLst>
               </a:tr>
@@ -32876,7 +32876,7 @@
                 </a:tc>
                 <a:extLst>
                   <a:ext uri="{0D108BD9-81ED-4DB2-BD59-A6C34878D82A}">
-                    <a16:rowId xmlns:a16="http://schemas.microsoft.com/office/drawing/2014/main" xmlns="" val="10002"/>
+                    <a16:rowId xmlns="" xmlns:a16="http://schemas.microsoft.com/office/drawing/2014/main" val="10002"/>
                   </a:ext>
                 </a:extLst>
               </a:tr>
@@ -34104,7 +34104,7 @@
           <p:nvPr>
             <p:extLst>
               <p:ext uri="{D42A27DB-BD31-4B8C-83A1-F6EECF244321}">
-                <p14:modId xmlns:p14="http://schemas.microsoft.com/office/powerpoint/2010/main" val="3462541706"/>
+                <p14:modId xmlns:p14="http://schemas.microsoft.com/office/powerpoint/2010/main" val="1701961634"/>
               </p:ext>
             </p:extLst>
           </p:nvPr>
@@ -34123,28 +34123,28 @@
                 <a:gridCol w="2794925">
                   <a:extLst>
                     <a:ext uri="{9D8B030D-6E8A-4147-A177-3AD203B41FA5}">
-                      <a16:colId xmlns:a16="http://schemas.microsoft.com/office/drawing/2014/main" xmlns="" val="20000"/>
+                      <a16:colId xmlns="" xmlns:a16="http://schemas.microsoft.com/office/drawing/2014/main" val="20000"/>
                     </a:ext>
                   </a:extLst>
                 </a:gridCol>
                 <a:gridCol w="2683565">
                   <a:extLst>
                     <a:ext uri="{9D8B030D-6E8A-4147-A177-3AD203B41FA5}">
-                      <a16:colId xmlns:a16="http://schemas.microsoft.com/office/drawing/2014/main" xmlns="" val="20001"/>
+                      <a16:colId xmlns="" xmlns:a16="http://schemas.microsoft.com/office/drawing/2014/main" val="20001"/>
                     </a:ext>
                   </a:extLst>
                 </a:gridCol>
                 <a:gridCol w="2782957">
                   <a:extLst>
                     <a:ext uri="{9D8B030D-6E8A-4147-A177-3AD203B41FA5}">
-                      <a16:colId xmlns:a16="http://schemas.microsoft.com/office/drawing/2014/main" xmlns="" val="20002"/>
+                      <a16:colId xmlns="" xmlns:a16="http://schemas.microsoft.com/office/drawing/2014/main" val="20002"/>
                     </a:ext>
                   </a:extLst>
                 </a:gridCol>
                 <a:gridCol w="2696816">
                   <a:extLst>
                     <a:ext uri="{9D8B030D-6E8A-4147-A177-3AD203B41FA5}">
-                      <a16:colId xmlns:a16="http://schemas.microsoft.com/office/drawing/2014/main" xmlns="" val="20003"/>
+                      <a16:colId xmlns="" xmlns:a16="http://schemas.microsoft.com/office/drawing/2014/main" val="20003"/>
                     </a:ext>
                   </a:extLst>
                 </a:gridCol>
@@ -34361,7 +34361,7 @@
                 </a:tc>
                 <a:extLst>
                   <a:ext uri="{0D108BD9-81ED-4DB2-BD59-A6C34878D82A}">
-                    <a16:rowId xmlns:a16="http://schemas.microsoft.com/office/drawing/2014/main" xmlns="" val="10000"/>
+                    <a16:rowId xmlns="" xmlns:a16="http://schemas.microsoft.com/office/drawing/2014/main" val="10000"/>
                   </a:ext>
                 </a:extLst>
               </a:tr>
@@ -34579,7 +34579,7 @@
                 </a:tc>
                 <a:extLst>
                   <a:ext uri="{0D108BD9-81ED-4DB2-BD59-A6C34878D82A}">
-                    <a16:rowId xmlns:a16="http://schemas.microsoft.com/office/drawing/2014/main" xmlns="" val="10001"/>
+                    <a16:rowId xmlns="" xmlns:a16="http://schemas.microsoft.com/office/drawing/2014/main" val="10001"/>
                   </a:ext>
                 </a:extLst>
               </a:tr>
@@ -34924,6 +34924,18 @@
                         <a:buChar char="•"/>
                       </a:pPr>
                       <a:r>
+                        <a:rPr lang="en-US" sz="1200" baseline="0" smtClean="0">
+                          <a:solidFill>
+                            <a:srgbClr val="797A7D">
+                              <a:lumMod val="50000"/>
+                            </a:srgbClr>
+                          </a:solidFill>
+                          <a:ea typeface="Segoe UI" pitchFamily="34" charset="0"/>
+                          <a:cs typeface="Segoe UI" pitchFamily="34" charset="0"/>
+                        </a:rPr>
+                        <a:t>Office 365 </a:t>
+                      </a:r>
+                      <a:r>
                         <a:rPr lang="en-US" sz="1200" baseline="0" dirty="0" smtClean="0">
                           <a:solidFill>
                             <a:srgbClr val="797A7D">
@@ -34933,7 +34945,7 @@
                           <a:ea typeface="Segoe UI" pitchFamily="34" charset="0"/>
                           <a:cs typeface="Segoe UI" pitchFamily="34" charset="0"/>
                         </a:rPr>
-                        <a:t>SPO-D operational support</a:t>
+                        <a:t>operational support</a:t>
                       </a:r>
                     </a:p>
                     <a:p>
@@ -35151,7 +35163,7 @@
                 </a:tc>
                 <a:extLst>
                   <a:ext uri="{0D108BD9-81ED-4DB2-BD59-A6C34878D82A}">
-                    <a16:rowId xmlns:a16="http://schemas.microsoft.com/office/drawing/2014/main" xmlns="" val="10002"/>
+                    <a16:rowId xmlns="" xmlns:a16="http://schemas.microsoft.com/office/drawing/2014/main" val="10002"/>
                   </a:ext>
                 </a:extLst>
               </a:tr>
@@ -37928,28 +37940,28 @@
                 <a:gridCol w="5965345">
                   <a:extLst>
                     <a:ext uri="{9D8B030D-6E8A-4147-A177-3AD203B41FA5}">
-                      <a16:colId xmlns="" xmlns:a16="http://schemas.microsoft.com/office/drawing/2014/main" val="20000"/>
+                      <a16:colId xmlns:a16="http://schemas.microsoft.com/office/drawing/2014/main" xmlns="" val="20000"/>
                     </a:ext>
                   </a:extLst>
                 </a:gridCol>
                 <a:gridCol w="568903">
                   <a:extLst>
                     <a:ext uri="{9D8B030D-6E8A-4147-A177-3AD203B41FA5}">
-                      <a16:colId xmlns="" xmlns:a16="http://schemas.microsoft.com/office/drawing/2014/main" val="20001"/>
+                      <a16:colId xmlns:a16="http://schemas.microsoft.com/office/drawing/2014/main" xmlns="" val="20001"/>
                     </a:ext>
                   </a:extLst>
                 </a:gridCol>
                 <a:gridCol w="520140">
                   <a:extLst>
                     <a:ext uri="{9D8B030D-6E8A-4147-A177-3AD203B41FA5}">
-                      <a16:colId xmlns="" xmlns:a16="http://schemas.microsoft.com/office/drawing/2014/main" val="20002"/>
+                      <a16:colId xmlns:a16="http://schemas.microsoft.com/office/drawing/2014/main" xmlns="" val="20002"/>
                     </a:ext>
                   </a:extLst>
                 </a:gridCol>
                 <a:gridCol w="520140">
                   <a:extLst>
                     <a:ext uri="{9D8B030D-6E8A-4147-A177-3AD203B41FA5}">
-                      <a16:colId xmlns="" xmlns:a16="http://schemas.microsoft.com/office/drawing/2014/main" val="2588272693"/>
+                      <a16:colId xmlns:a16="http://schemas.microsoft.com/office/drawing/2014/main" xmlns="" val="2588272693"/>
                     </a:ext>
                   </a:extLst>
                 </a:gridCol>
@@ -38055,7 +38067,7 @@
                 </a:tc>
                 <a:extLst>
                   <a:ext uri="{0D108BD9-81ED-4DB2-BD59-A6C34878D82A}">
-                    <a16:rowId xmlns="" xmlns:a16="http://schemas.microsoft.com/office/drawing/2014/main" val="10000"/>
+                    <a16:rowId xmlns:a16="http://schemas.microsoft.com/office/drawing/2014/main" xmlns="" val="10000"/>
                   </a:ext>
                 </a:extLst>
               </a:tr>
@@ -38172,7 +38184,7 @@
                 </a:tc>
                 <a:extLst>
                   <a:ext uri="{0D108BD9-81ED-4DB2-BD59-A6C34878D82A}">
-                    <a16:rowId xmlns="" xmlns:a16="http://schemas.microsoft.com/office/drawing/2014/main" val="10001"/>
+                    <a16:rowId xmlns:a16="http://schemas.microsoft.com/office/drawing/2014/main" xmlns="" val="10001"/>
                   </a:ext>
                 </a:extLst>
               </a:tr>
@@ -38294,7 +38306,7 @@
                 </a:tc>
                 <a:extLst>
                   <a:ext uri="{0D108BD9-81ED-4DB2-BD59-A6C34878D82A}">
-                    <a16:rowId xmlns="" xmlns:a16="http://schemas.microsoft.com/office/drawing/2014/main" val="10002"/>
+                    <a16:rowId xmlns:a16="http://schemas.microsoft.com/office/drawing/2014/main" xmlns="" val="10002"/>
                   </a:ext>
                 </a:extLst>
               </a:tr>
@@ -38416,7 +38428,7 @@
                 </a:tc>
                 <a:extLst>
                   <a:ext uri="{0D108BD9-81ED-4DB2-BD59-A6C34878D82A}">
-                    <a16:rowId xmlns="" xmlns:a16="http://schemas.microsoft.com/office/drawing/2014/main" val="10003"/>
+                    <a16:rowId xmlns:a16="http://schemas.microsoft.com/office/drawing/2014/main" xmlns="" val="10003"/>
                   </a:ext>
                 </a:extLst>
               </a:tr>
@@ -38538,7 +38550,7 @@
                 </a:tc>
                 <a:extLst>
                   <a:ext uri="{0D108BD9-81ED-4DB2-BD59-A6C34878D82A}">
-                    <a16:rowId xmlns="" xmlns:a16="http://schemas.microsoft.com/office/drawing/2014/main" val="10004"/>
+                    <a16:rowId xmlns:a16="http://schemas.microsoft.com/office/drawing/2014/main" xmlns="" val="10004"/>
                   </a:ext>
                 </a:extLst>
               </a:tr>
@@ -38660,7 +38672,7 @@
                 </a:tc>
                 <a:extLst>
                   <a:ext uri="{0D108BD9-81ED-4DB2-BD59-A6C34878D82A}">
-                    <a16:rowId xmlns="" xmlns:a16="http://schemas.microsoft.com/office/drawing/2014/main" val="10005"/>
+                    <a16:rowId xmlns:a16="http://schemas.microsoft.com/office/drawing/2014/main" xmlns="" val="10005"/>
                   </a:ext>
                 </a:extLst>
               </a:tr>
@@ -38782,7 +38794,7 @@
                 </a:tc>
                 <a:extLst>
                   <a:ext uri="{0D108BD9-81ED-4DB2-BD59-A6C34878D82A}">
-                    <a16:rowId xmlns="" xmlns:a16="http://schemas.microsoft.com/office/drawing/2014/main" val="10006"/>
+                    <a16:rowId xmlns:a16="http://schemas.microsoft.com/office/drawing/2014/main" xmlns="" val="10006"/>
                   </a:ext>
                 </a:extLst>
               </a:tr>
@@ -39924,28 +39936,28 @@
                 <a:gridCol w="5965345">
                   <a:extLst>
                     <a:ext uri="{9D8B030D-6E8A-4147-A177-3AD203B41FA5}">
-                      <a16:colId xmlns="" xmlns:a16="http://schemas.microsoft.com/office/drawing/2014/main" val="20000"/>
+                      <a16:colId xmlns:a16="http://schemas.microsoft.com/office/drawing/2014/main" xmlns="" val="20000"/>
                     </a:ext>
                   </a:extLst>
                 </a:gridCol>
                 <a:gridCol w="568903">
                   <a:extLst>
                     <a:ext uri="{9D8B030D-6E8A-4147-A177-3AD203B41FA5}">
-                      <a16:colId xmlns="" xmlns:a16="http://schemas.microsoft.com/office/drawing/2014/main" val="20001"/>
+                      <a16:colId xmlns:a16="http://schemas.microsoft.com/office/drawing/2014/main" xmlns="" val="20001"/>
                     </a:ext>
                   </a:extLst>
                 </a:gridCol>
                 <a:gridCol w="520140">
                   <a:extLst>
                     <a:ext uri="{9D8B030D-6E8A-4147-A177-3AD203B41FA5}">
-                      <a16:colId xmlns="" xmlns:a16="http://schemas.microsoft.com/office/drawing/2014/main" val="20002"/>
+                      <a16:colId xmlns:a16="http://schemas.microsoft.com/office/drawing/2014/main" xmlns="" val="20002"/>
                     </a:ext>
                   </a:extLst>
                 </a:gridCol>
                 <a:gridCol w="520140">
                   <a:extLst>
                     <a:ext uri="{9D8B030D-6E8A-4147-A177-3AD203B41FA5}">
-                      <a16:colId xmlns="" xmlns:a16="http://schemas.microsoft.com/office/drawing/2014/main" val="1173184688"/>
+                      <a16:colId xmlns:a16="http://schemas.microsoft.com/office/drawing/2014/main" xmlns="" val="1173184688"/>
                     </a:ext>
                   </a:extLst>
                 </a:gridCol>
@@ -40051,7 +40063,7 @@
                 </a:tc>
                 <a:extLst>
                   <a:ext uri="{0D108BD9-81ED-4DB2-BD59-A6C34878D82A}">
-                    <a16:rowId xmlns="" xmlns:a16="http://schemas.microsoft.com/office/drawing/2014/main" val="10000"/>
+                    <a16:rowId xmlns:a16="http://schemas.microsoft.com/office/drawing/2014/main" xmlns="" val="10000"/>
                   </a:ext>
                 </a:extLst>
               </a:tr>
@@ -40169,7 +40181,7 @@
                 </a:tc>
                 <a:extLst>
                   <a:ext uri="{0D108BD9-81ED-4DB2-BD59-A6C34878D82A}">
-                    <a16:rowId xmlns="" xmlns:a16="http://schemas.microsoft.com/office/drawing/2014/main" val="10002"/>
+                    <a16:rowId xmlns:a16="http://schemas.microsoft.com/office/drawing/2014/main" xmlns="" val="10002"/>
                   </a:ext>
                 </a:extLst>
               </a:tr>
@@ -40292,7 +40304,7 @@
                 </a:tc>
                 <a:extLst>
                   <a:ext uri="{0D108BD9-81ED-4DB2-BD59-A6C34878D82A}">
-                    <a16:rowId xmlns="" xmlns:a16="http://schemas.microsoft.com/office/drawing/2014/main" val="10003"/>
+                    <a16:rowId xmlns:a16="http://schemas.microsoft.com/office/drawing/2014/main" xmlns="" val="10003"/>
                   </a:ext>
                 </a:extLst>
               </a:tr>
@@ -40416,7 +40428,7 @@
                 </a:tc>
                 <a:extLst>
                   <a:ext uri="{0D108BD9-81ED-4DB2-BD59-A6C34878D82A}">
-                    <a16:rowId xmlns="" xmlns:a16="http://schemas.microsoft.com/office/drawing/2014/main" val="10004"/>
+                    <a16:rowId xmlns:a16="http://schemas.microsoft.com/office/drawing/2014/main" xmlns="" val="10004"/>
                   </a:ext>
                 </a:extLst>
               </a:tr>
@@ -40556,7 +40568,7 @@
                 </a:tc>
                 <a:extLst>
                   <a:ext uri="{0D108BD9-81ED-4DB2-BD59-A6C34878D82A}">
-                    <a16:rowId xmlns="" xmlns:a16="http://schemas.microsoft.com/office/drawing/2014/main" val="10005"/>
+                    <a16:rowId xmlns:a16="http://schemas.microsoft.com/office/drawing/2014/main" xmlns="" val="10005"/>
                   </a:ext>
                 </a:extLst>
               </a:tr>
@@ -43539,14 +43551,14 @@
                 <a:gridCol w="4229100">
                   <a:extLst>
                     <a:ext uri="{9D8B030D-6E8A-4147-A177-3AD203B41FA5}">
-                      <a16:colId xmlns:a16="http://schemas.microsoft.com/office/drawing/2014/main" xmlns="" val="20000"/>
+                      <a16:colId xmlns="" xmlns:a16="http://schemas.microsoft.com/office/drawing/2014/main" val="20000"/>
                     </a:ext>
                   </a:extLst>
                 </a:gridCol>
                 <a:gridCol w="542926">
                   <a:extLst>
                     <a:ext uri="{9D8B030D-6E8A-4147-A177-3AD203B41FA5}">
-                      <a16:colId xmlns:a16="http://schemas.microsoft.com/office/drawing/2014/main" xmlns="" val="20001"/>
+                      <a16:colId xmlns="" xmlns:a16="http://schemas.microsoft.com/office/drawing/2014/main" val="20001"/>
                     </a:ext>
                   </a:extLst>
                 </a:gridCol>
@@ -43608,7 +43620,7 @@
                 </a:tc>
                 <a:extLst>
                   <a:ext uri="{0D108BD9-81ED-4DB2-BD59-A6C34878D82A}">
-                    <a16:rowId xmlns:a16="http://schemas.microsoft.com/office/drawing/2014/main" xmlns="" val="10000"/>
+                    <a16:rowId xmlns="" xmlns:a16="http://schemas.microsoft.com/office/drawing/2014/main" val="10000"/>
                   </a:ext>
                 </a:extLst>
               </a:tr>
@@ -43678,7 +43690,7 @@
                 </a:tc>
                 <a:extLst>
                   <a:ext uri="{0D108BD9-81ED-4DB2-BD59-A6C34878D82A}">
-                    <a16:rowId xmlns:a16="http://schemas.microsoft.com/office/drawing/2014/main" xmlns="" val="10001"/>
+                    <a16:rowId xmlns="" xmlns:a16="http://schemas.microsoft.com/office/drawing/2014/main" val="10001"/>
                   </a:ext>
                 </a:extLst>
               </a:tr>
@@ -43746,7 +43758,7 @@
                 </a:tc>
                 <a:extLst>
                   <a:ext uri="{0D108BD9-81ED-4DB2-BD59-A6C34878D82A}">
-                    <a16:rowId xmlns:a16="http://schemas.microsoft.com/office/drawing/2014/main" xmlns="" val="10002"/>
+                    <a16:rowId xmlns="" xmlns:a16="http://schemas.microsoft.com/office/drawing/2014/main" val="10002"/>
                   </a:ext>
                 </a:extLst>
               </a:tr>
@@ -43819,7 +43831,7 @@
                 </a:tc>
                 <a:extLst>
                   <a:ext uri="{0D108BD9-81ED-4DB2-BD59-A6C34878D82A}">
-                    <a16:rowId xmlns:a16="http://schemas.microsoft.com/office/drawing/2014/main" xmlns="" val="10003"/>
+                    <a16:rowId xmlns="" xmlns:a16="http://schemas.microsoft.com/office/drawing/2014/main" val="10003"/>
                   </a:ext>
                 </a:extLst>
               </a:tr>
@@ -43901,7 +43913,7 @@
                 </a:tc>
                 <a:extLst>
                   <a:ext uri="{0D108BD9-81ED-4DB2-BD59-A6C34878D82A}">
-                    <a16:rowId xmlns:a16="http://schemas.microsoft.com/office/drawing/2014/main" xmlns="" val="10004"/>
+                    <a16:rowId xmlns="" xmlns:a16="http://schemas.microsoft.com/office/drawing/2014/main" val="10004"/>
                   </a:ext>
                 </a:extLst>
               </a:tr>
@@ -45507,6 +45519,21 @@
 </file>
 
 <file path=customXml/item1.xml><?xml version="1.0" encoding="utf-8"?>
+<?mso-contentType ?>
+<FormTemplates xmlns="http://schemas.microsoft.com/sharepoint/v3/contenttype/forms">
+  <Display>DocumentLibraryForm</Display>
+  <Edit>DocumentLibraryForm</Edit>
+  <New>DocumentLibraryForm</New>
+</FormTemplates>
+</file>
+
+<file path=customXml/item2.xml><?xml version="1.0" encoding="utf-8"?>
+<p:properties xmlns:p="http://schemas.microsoft.com/office/2006/metadata/properties" xmlns:xsi="http://www.w3.org/2001/XMLSchema-instance" xmlns:pc="http://schemas.microsoft.com/office/infopath/2007/PartnerControls">
+  <documentManagement/>
+</p:properties>
+</file>
+
+<file path=customXml/item3.xml><?xml version="1.0" encoding="utf-8"?>
 <ct:contentTypeSchema xmlns:ct="http://schemas.microsoft.com/office/2006/metadata/contentType" xmlns:ma="http://schemas.microsoft.com/office/2006/metadata/properties/metaAttributes" ct:_="" ma:_="" ma:contentTypeName="Document" ma:contentTypeID="0x01010055B2CD89C57E654B9987E9AA8CA4BF0D" ma:contentTypeVersion="0" ma:contentTypeDescription="Create a new document." ma:contentTypeScope="" ma:versionID="18de93eb0ee0f4f315a1ec1a884e13c6">
   <xsd:schema xmlns:xsd="http://www.w3.org/2001/XMLSchema" xmlns:xs="http://www.w3.org/2001/XMLSchema" xmlns:p="http://schemas.microsoft.com/office/2006/metadata/properties" targetNamespace="http://schemas.microsoft.com/office/2006/metadata/properties" ma:root="true" ma:fieldsID="a7c9ea3003598ff63be50cfc9788e6e2">
     <xsd:element name="properties">
@@ -45620,33 +45647,10 @@
 </ct:contentTypeSchema>
 </file>
 
-<file path=customXml/item2.xml><?xml version="1.0" encoding="utf-8"?>
-<p:properties xmlns:p="http://schemas.microsoft.com/office/2006/metadata/properties" xmlns:xsi="http://www.w3.org/2001/XMLSchema-instance" xmlns:pc="http://schemas.microsoft.com/office/infopath/2007/PartnerControls">
-  <documentManagement/>
-</p:properties>
-</file>
-
-<file path=customXml/item3.xml><?xml version="1.0" encoding="utf-8"?>
-<?mso-contentType ?>
-<FormTemplates xmlns="http://schemas.microsoft.com/sharepoint/v3/contenttype/forms">
-  <Display>DocumentLibraryForm</Display>
-  <Edit>DocumentLibraryForm</Edit>
-  <New>DocumentLibraryForm</New>
-</FormTemplates>
-</file>
-
 <file path=customXml/itemProps1.xml><?xml version="1.0" encoding="utf-8"?>
-<ds:datastoreItem xmlns:ds="http://schemas.openxmlformats.org/officeDocument/2006/customXml" ds:itemID="{E2F29384-BD65-45EE-AC22-B03A76D49F37}">
+<ds:datastoreItem xmlns:ds="http://schemas.openxmlformats.org/officeDocument/2006/customXml" ds:itemID="{B4606E04-852E-4880-8CD1-0B186F4087B1}">
   <ds:schemaRefs>
-    <ds:schemaRef ds:uri="http://schemas.microsoft.com/office/2006/metadata/contentType"/>
-    <ds:schemaRef ds:uri="http://schemas.microsoft.com/office/2006/metadata/properties/metaAttributes"/>
-    <ds:schemaRef ds:uri="http://www.w3.org/2001/XMLSchema"/>
-    <ds:schemaRef ds:uri="http://schemas.microsoft.com/office/2006/metadata/properties"/>
-    <ds:schemaRef ds:uri="http://schemas.openxmlformats.org/package/2006/metadata/core-properties"/>
-    <ds:schemaRef ds:uri="http://purl.org/dc/elements/1.1/"/>
-    <ds:schemaRef ds:uri="http://purl.org/dc/terms/"/>
-    <ds:schemaRef ds:uri="http://schemas.microsoft.com/internal/obd"/>
-    <ds:schemaRef ds:uri="http://schemas.microsoft.com/office/infopath/2007/PartnerControls"/>
+    <ds:schemaRef ds:uri="http://schemas.microsoft.com/sharepoint/v3/contenttype/forms"/>
   </ds:schemaRefs>
 </ds:datastoreItem>
 </file>
@@ -45667,9 +45671,17 @@
 </file>
 
 <file path=customXml/itemProps3.xml><?xml version="1.0" encoding="utf-8"?>
-<ds:datastoreItem xmlns:ds="http://schemas.openxmlformats.org/officeDocument/2006/customXml" ds:itemID="{B4606E04-852E-4880-8CD1-0B186F4087B1}">
+<ds:datastoreItem xmlns:ds="http://schemas.openxmlformats.org/officeDocument/2006/customXml" ds:itemID="{E2F29384-BD65-45EE-AC22-B03A76D49F37}">
   <ds:schemaRefs>
-    <ds:schemaRef ds:uri="http://schemas.microsoft.com/sharepoint/v3/contenttype/forms"/>
+    <ds:schemaRef ds:uri="http://schemas.microsoft.com/office/2006/metadata/contentType"/>
+    <ds:schemaRef ds:uri="http://schemas.microsoft.com/office/2006/metadata/properties/metaAttributes"/>
+    <ds:schemaRef ds:uri="http://www.w3.org/2001/XMLSchema"/>
+    <ds:schemaRef ds:uri="http://schemas.microsoft.com/office/2006/metadata/properties"/>
+    <ds:schemaRef ds:uri="http://schemas.openxmlformats.org/package/2006/metadata/core-properties"/>
+    <ds:schemaRef ds:uri="http://purl.org/dc/elements/1.1/"/>
+    <ds:schemaRef ds:uri="http://purl.org/dc/terms/"/>
+    <ds:schemaRef ds:uri="http://schemas.microsoft.com/internal/obd"/>
+    <ds:schemaRef ds:uri="http://schemas.microsoft.com/office/infopath/2007/PartnerControls"/>
   </ds:schemaRefs>
 </ds:datastoreItem>
 </file>
</xml_diff>